<commit_message>
fixed typo in L6.2 Slide 4
</commit_message>
<xml_diff>
--- a/Slides/Lesson 6.2 Generalizing Over Functions.pptx
+++ b/Slides/Lesson 6.2 Generalizing Over Functions.pptx
@@ -165,6 +165,10 @@
 </p:cmAuthorLst>
 </file>
 
+<file path=ppt/revisionInfo.xml><?xml version="1.0" encoding="utf-8"?>
+<p1510:revInfo xmlns:a="http://schemas.openxmlformats.org/drawingml/2006/main" xmlns:r="http://schemas.openxmlformats.org/officeDocument/2006/relationships" xmlns:p1510="http://schemas.microsoft.com/office/powerpoint/2015/10/main"/>
+</file>
+
 <file path=ppt/notesMasters/notesMaster1.xml><?xml version="1.0" encoding="utf-8"?>
 <p:notesMaster xmlns:a="http://schemas.openxmlformats.org/drawingml/2006/main" xmlns:r="http://schemas.openxmlformats.org/officeDocument/2006/relationships" xmlns:p="http://schemas.openxmlformats.org/presentationml/2006/main">
   <p:cSld>
@@ -248,7 +252,7 @@
             <a:fld id="{CF8F25F6-E1EF-4065-8525-42EDEBD9BD22}" type="datetimeFigureOut">
               <a:rPr lang="en-US" smtClean="0"/>
               <a:pPr/>
-              <a:t>9/6/2017</a:t>
+              <a:t>10/27/2017</a:t>
             </a:fld>
             <a:endParaRPr lang="en-US"/>
           </a:p>
@@ -2094,7 +2098,7 @@
           <a:p>
             <a:fld id="{2F1F79F5-7BEC-496A-AFC7-876E38F64D71}" type="datetime1">
               <a:rPr lang="en-US" smtClean="0"/>
-              <a:t>9/6/2017</a:t>
+              <a:t>10/27/2017</a:t>
             </a:fld>
             <a:endParaRPr lang="en-US"/>
           </a:p>
@@ -2189,7 +2193,7 @@
           <a:p>
             <a:fld id="{0A05703A-7669-4FEA-9056-25299B4D29D4}" type="datetime1">
               <a:rPr lang="en-US" smtClean="0"/>
-              <a:t>9/6/2017</a:t>
+              <a:t>10/27/2017</a:t>
             </a:fld>
             <a:endParaRPr lang="en-US"/>
           </a:p>
@@ -2464,7 +2468,7 @@
           <a:p>
             <a:fld id="{6E5077B5-BB57-49DB-88CA-226A139E5C01}" type="datetime1">
               <a:rPr lang="en-US" smtClean="0"/>
-              <a:t>9/6/2017</a:t>
+              <a:t>10/27/2017</a:t>
             </a:fld>
             <a:endParaRPr lang="en-US"/>
           </a:p>
@@ -2716,7 +2720,7 @@
           <a:p>
             <a:fld id="{C48D9447-CBD6-49A1-89FD-8512A8CF8999}" type="datetime1">
               <a:rPr lang="en-US" smtClean="0"/>
-              <a:t>9/6/2017</a:t>
+              <a:t>10/27/2017</a:t>
             </a:fld>
             <a:endParaRPr lang="en-US"/>
           </a:p>
@@ -2884,7 +2888,7 @@
           <a:p>
             <a:fld id="{A3639A2A-823D-48B7-9ACE-7FAF42870BA9}" type="datetime1">
               <a:rPr lang="en-US" smtClean="0"/>
-              <a:t>9/6/2017</a:t>
+              <a:t>10/27/2017</a:t>
             </a:fld>
             <a:endParaRPr lang="en-US"/>
           </a:p>
@@ -3062,7 +3066,7 @@
           <a:p>
             <a:fld id="{ED1B6996-82E9-463C-972C-7B56056E426C}" type="datetime1">
               <a:rPr lang="en-US" smtClean="0"/>
-              <a:t>9/6/2017</a:t>
+              <a:t>10/27/2017</a:t>
             </a:fld>
             <a:endParaRPr lang="en-US"/>
           </a:p>
@@ -3236,7 +3240,7 @@
           <a:p>
             <a:fld id="{E22ED4DA-448D-4BB1-B935-CC112220207B}" type="datetime1">
               <a:rPr lang="en-US" smtClean="0"/>
-              <a:t>9/6/2017</a:t>
+              <a:t>10/27/2017</a:t>
             </a:fld>
             <a:endParaRPr lang="en-US"/>
           </a:p>
@@ -3409,7 +3413,7 @@
           <a:p>
             <a:fld id="{E22ED4DA-448D-4BB1-B935-CC112220207B}" type="datetime1">
               <a:rPr lang="en-US" smtClean="0"/>
-              <a:t>9/6/2017</a:t>
+              <a:t>10/27/2017</a:t>
             </a:fld>
             <a:endParaRPr lang="en-US"/>
           </a:p>
@@ -3669,7 +3673,7 @@
           <a:p>
             <a:fld id="{FF5D65A6-AB94-4435-B0B7-3743215FA46C}" type="datetime1">
               <a:rPr lang="en-US" smtClean="0"/>
-              <a:t>9/6/2017</a:t>
+              <a:t>10/27/2017</a:t>
             </a:fld>
             <a:endParaRPr lang="en-US"/>
           </a:p>
@@ -3845,7 +3849,7 @@
           <a:p>
             <a:fld id="{FF5D65A6-AB94-4435-B0B7-3743215FA46C}" type="datetime1">
               <a:rPr lang="en-US" smtClean="0"/>
-              <a:t>9/6/2017</a:t>
+              <a:t>10/27/2017</a:t>
             </a:fld>
             <a:endParaRPr lang="en-US"/>
           </a:p>
@@ -4139,7 +4143,7 @@
           <a:p>
             <a:fld id="{7C193DC4-6EF0-48C9-B29C-616106A645E1}" type="datetime1">
               <a:rPr lang="en-US" smtClean="0"/>
-              <a:t>9/6/2017</a:t>
+              <a:t>10/27/2017</a:t>
             </a:fld>
             <a:endParaRPr lang="en-US"/>
           </a:p>
@@ -4424,7 +4428,7 @@
           <a:p>
             <a:fld id="{5D1846AD-9252-4647-9435-4C2AC365653A}" type="datetime1">
               <a:rPr lang="en-US" smtClean="0"/>
-              <a:t>9/6/2017</a:t>
+              <a:t>10/27/2017</a:t>
             </a:fld>
             <a:endParaRPr lang="en-US"/>
           </a:p>
@@ -4843,7 +4847,7 @@
           <a:p>
             <a:fld id="{CE56DC10-3561-4063-A6AF-C1CC7A41040A}" type="datetime1">
               <a:rPr lang="en-US" smtClean="0"/>
-              <a:t>9/6/2017</a:t>
+              <a:t>10/27/2017</a:t>
             </a:fld>
             <a:endParaRPr lang="en-US"/>
           </a:p>
@@ -4960,7 +4964,7 @@
           <a:p>
             <a:fld id="{2F7B77F5-1464-4F6B-92A8-64FC8A508293}" type="datetime1">
               <a:rPr lang="en-US" smtClean="0"/>
-              <a:t>9/6/2017</a:t>
+              <a:t>10/27/2017</a:t>
             </a:fld>
             <a:endParaRPr lang="en-US"/>
           </a:p>
@@ -5183,7 +5187,7 @@
           <a:p>
             <a:fld id="{02B3F677-983B-48DB-ADFD-63FE6CBC7FB2}" type="datetime1">
               <a:rPr lang="en-US" smtClean="0"/>
-              <a:t>9/6/2017</a:t>
+              <a:t>10/27/2017</a:t>
             </a:fld>
             <a:endParaRPr lang="en-US"/>
           </a:p>
@@ -12602,7 +12606,7 @@
                 <a:latin typeface="Consolas" pitchFamily="49" charset="0"/>
                 <a:cs typeface="Consolas" pitchFamily="49" charset="0"/>
               </a:rPr>
-              <a:t>;; (add-1-to-each (list 11 22 33)) = (list 12 23 34)</a:t>
+              <a:t>;; (add1-to-each (list 11 22 33)) = (list 12 23 34)</a:t>
             </a:r>
           </a:p>
           <a:p>
@@ -12651,7 +12655,14 @@
                 <a:latin typeface="Consolas" pitchFamily="49" charset="0"/>
                 <a:cs typeface="Consolas" pitchFamily="49" charset="0"/>
               </a:rPr>
-              <a:t>  (define (add-1-to-each </a:t>
+              <a:t>  (define </a:t>
+            </a:r>
+            <a:r>
+              <a:rPr lang="en-US" sz="2400" b="1">
+                <a:latin typeface="Consolas" pitchFamily="49" charset="0"/>
+                <a:cs typeface="Consolas" pitchFamily="49" charset="0"/>
+              </a:rPr>
+              <a:t>(add1-to-each </a:t>
             </a:r>
             <a:r>
               <a:rPr lang="en-US" sz="2400" b="1" dirty="0" err="1">

</xml_diff>